<commit_message>
sync with daily practice
</commit_message>
<xml_diff>
--- a/neet/tamil_biology/files/11th_Bio_Botany_Tamil_U01.pptx
+++ b/neet/tamil_biology/files/11th_Bio_Botany_Tamil_U01.pptx
@@ -361,7 +361,7 @@
           <a:p>
             <a:fld id="{5BCAD085-E8A6-8845-BD4E-CB4CCA059FC4}" type="datetimeFigureOut">
               <a:rPr lang="en-US" smtClean="0"/>
-              <a:t>8/29/2020</a:t>
+              <a:t>8/30/2020</a:t>
             </a:fld>
             <a:endParaRPr lang="en-US"/>
           </a:p>
@@ -529,7 +529,7 @@
           <a:p>
             <a:fld id="{5BCAD085-E8A6-8845-BD4E-CB4CCA059FC4}" type="datetimeFigureOut">
               <a:rPr lang="en-US" smtClean="0"/>
-              <a:t>8/29/2020</a:t>
+              <a:t>8/30/2020</a:t>
             </a:fld>
             <a:endParaRPr lang="en-US"/>
           </a:p>
@@ -707,7 +707,7 @@
           <a:p>
             <a:fld id="{5BCAD085-E8A6-8845-BD4E-CB4CCA059FC4}" type="datetimeFigureOut">
               <a:rPr lang="en-US" smtClean="0"/>
-              <a:t>8/29/2020</a:t>
+              <a:t>8/30/2020</a:t>
             </a:fld>
             <a:endParaRPr lang="en-US"/>
           </a:p>
@@ -875,7 +875,7 @@
           <a:p>
             <a:fld id="{5BCAD085-E8A6-8845-BD4E-CB4CCA059FC4}" type="datetimeFigureOut">
               <a:rPr lang="en-US" smtClean="0"/>
-              <a:t>8/29/2020</a:t>
+              <a:t>8/30/2020</a:t>
             </a:fld>
             <a:endParaRPr lang="en-US"/>
           </a:p>
@@ -1120,7 +1120,7 @@
           <a:p>
             <a:fld id="{5BCAD085-E8A6-8845-BD4E-CB4CCA059FC4}" type="datetimeFigureOut">
               <a:rPr lang="en-US" smtClean="0"/>
-              <a:t>8/29/2020</a:t>
+              <a:t>8/30/2020</a:t>
             </a:fld>
             <a:endParaRPr lang="en-US"/>
           </a:p>
@@ -1405,7 +1405,7 @@
           <a:p>
             <a:fld id="{5BCAD085-E8A6-8845-BD4E-CB4CCA059FC4}" type="datetimeFigureOut">
               <a:rPr lang="en-US" smtClean="0"/>
-              <a:t>8/29/2020</a:t>
+              <a:t>8/30/2020</a:t>
             </a:fld>
             <a:endParaRPr lang="en-US"/>
           </a:p>
@@ -1824,7 +1824,7 @@
           <a:p>
             <a:fld id="{5BCAD085-E8A6-8845-BD4E-CB4CCA059FC4}" type="datetimeFigureOut">
               <a:rPr lang="en-US" smtClean="0"/>
-              <a:t>8/29/2020</a:t>
+              <a:t>8/30/2020</a:t>
             </a:fld>
             <a:endParaRPr lang="en-US"/>
           </a:p>
@@ -1941,7 +1941,7 @@
           <a:p>
             <a:fld id="{5BCAD085-E8A6-8845-BD4E-CB4CCA059FC4}" type="datetimeFigureOut">
               <a:rPr lang="en-US" smtClean="0"/>
-              <a:t>8/29/2020</a:t>
+              <a:t>8/30/2020</a:t>
             </a:fld>
             <a:endParaRPr lang="en-US"/>
           </a:p>
@@ -2036,7 +2036,7 @@
           <a:p>
             <a:fld id="{5BCAD085-E8A6-8845-BD4E-CB4CCA059FC4}" type="datetimeFigureOut">
               <a:rPr lang="en-US" smtClean="0"/>
-              <a:t>8/29/2020</a:t>
+              <a:t>8/30/2020</a:t>
             </a:fld>
             <a:endParaRPr lang="en-US"/>
           </a:p>
@@ -2311,7 +2311,7 @@
           <a:p>
             <a:fld id="{5BCAD085-E8A6-8845-BD4E-CB4CCA059FC4}" type="datetimeFigureOut">
               <a:rPr lang="en-US" smtClean="0"/>
-              <a:t>8/29/2020</a:t>
+              <a:t>8/30/2020</a:t>
             </a:fld>
             <a:endParaRPr lang="en-US"/>
           </a:p>
@@ -2563,7 +2563,7 @@
           <a:p>
             <a:fld id="{5BCAD085-E8A6-8845-BD4E-CB4CCA059FC4}" type="datetimeFigureOut">
               <a:rPr lang="en-US" smtClean="0"/>
-              <a:t>8/29/2020</a:t>
+              <a:t>8/30/2020</a:t>
             </a:fld>
             <a:endParaRPr lang="en-US"/>
           </a:p>
@@ -2774,7 +2774,7 @@
           <a:p>
             <a:fld id="{5BCAD085-E8A6-8845-BD4E-CB4CCA059FC4}" type="datetimeFigureOut">
               <a:rPr lang="en-US" smtClean="0"/>
-              <a:t>8/29/2020</a:t>
+              <a:t>8/30/2020</a:t>
             </a:fld>
             <a:endParaRPr lang="en-US"/>
           </a:p>
@@ -13334,7 +13334,7 @@
           </a:bodyPr>
           <a:lstStyle/>
           <a:p>
-            <a:endParaRPr/>
+            <a:endParaRPr dirty="0"/>
           </a:p>
           <a:p>
             <a:pPr>
@@ -13346,48 +13346,162 @@
               </a:defRPr>
             </a:pPr>
             <a:r>
-              <a:t>Q - 28  கிரைசோஃபைட்கள், யூக்ளினாய்டுகள், டைனோஃபிளாச ஜெல்லேட்டுகள் மற்றும் ஸ்லைம் மோல்டுகள் இவை அனைத்தும் உள்ளடங்கிய பெரும்பிரிவு </a:t>
-            </a:r>
-          </a:p>
-          <a:p>
-            <a:endParaRPr/>
-          </a:p>
-          <a:p>
-            <a:r>
+              <a:rPr dirty="0"/>
+              <a:t>Q - 28  </a:t>
+            </a:r>
+            <a:r>
+              <a:rPr dirty="0" err="1"/>
+              <a:t>கிரைசோஃபைட்கள்</a:t>
+            </a:r>
+            <a:r>
+              <a:rPr dirty="0"/>
+              <a:t>, </a:t>
+            </a:r>
+            <a:r>
+              <a:rPr dirty="0" err="1"/>
+              <a:t>யூக்ளினாய்டுகள்</a:t>
+            </a:r>
+            <a:r>
+              <a:rPr dirty="0"/>
+              <a:t>, </a:t>
+            </a:r>
+            <a:r>
+              <a:rPr dirty="0" err="1"/>
+              <a:t>டைனோஃபிளாச</a:t>
+            </a:r>
+            <a:r>
+              <a:rPr dirty="0"/>
+              <a:t> </a:t>
+            </a:r>
+            <a:r>
+              <a:rPr dirty="0" err="1"/>
+              <a:t>ஜெல்லேட்டுகள்</a:t>
+            </a:r>
+            <a:r>
+              <a:rPr dirty="0"/>
+              <a:t> </a:t>
+            </a:r>
+            <a:r>
+              <a:rPr dirty="0" err="1"/>
+              <a:t>மற்றும்</a:t>
+            </a:r>
+            <a:r>
+              <a:rPr dirty="0"/>
+              <a:t> </a:t>
+            </a:r>
+            <a:r>
+              <a:rPr dirty="0" err="1"/>
+              <a:t>ஸ்லைம்</a:t>
+            </a:r>
+            <a:r>
+              <a:rPr dirty="0"/>
+              <a:t> </a:t>
+            </a:r>
+            <a:r>
+              <a:rPr dirty="0" err="1"/>
+              <a:t>மோல்டுகள்</a:t>
+            </a:r>
+            <a:r>
+              <a:rPr dirty="0"/>
+              <a:t> </a:t>
+            </a:r>
+            <a:r>
+              <a:rPr dirty="0" err="1"/>
+              <a:t>இவை</a:t>
+            </a:r>
+            <a:r>
+              <a:rPr dirty="0"/>
+              <a:t> </a:t>
+            </a:r>
+            <a:r>
+              <a:rPr dirty="0" err="1"/>
+              <a:t>அனைத்தும்</a:t>
+            </a:r>
+            <a:r>
+              <a:rPr dirty="0"/>
+              <a:t> </a:t>
+            </a:r>
+            <a:r>
+              <a:rPr dirty="0" err="1"/>
+              <a:t>உள்ளடங்கிய</a:t>
+            </a:r>
+            <a:r>
+              <a:rPr dirty="0"/>
+              <a:t> </a:t>
+            </a:r>
+            <a:r>
+              <a:rPr dirty="0" err="1"/>
+              <a:t>பெரும்பிரிவு</a:t>
+            </a:r>
+            <a:r>
+              <a:rPr dirty="0"/>
+              <a:t> </a:t>
+            </a:r>
+          </a:p>
+          <a:p>
+            <a:endParaRPr dirty="0"/>
+          </a:p>
+          <a:p>
+            <a:r>
+              <a:rPr dirty="0"/>
               <a:t>NEET - 2016</a:t>
             </a:r>
           </a:p>
           <a:p>
-            <a:endParaRPr/>
-          </a:p>
-          <a:p>
-            <a:r>
-              <a:t>அ) விலங்குகள்</a:t>
-            </a:r>
-          </a:p>
-          <a:p>
-            <a:endParaRPr/>
-          </a:p>
-          <a:p>
-            <a:r>
-              <a:t>ஆ) மொனிரா</a:t>
-            </a:r>
-          </a:p>
-          <a:p>
-            <a:endParaRPr/>
-          </a:p>
-          <a:p>
-            <a:r>
-              <a:t>இ) புரோட்டிஸ்டா</a:t>
-            </a:r>
-          </a:p>
-          <a:p>
-            <a:endParaRPr/>
-          </a:p>
-          <a:p>
-            <a:r>
-              <a:t>ஈ) பூஞ்சைகள்</a:t>
-            </a:r>
+            <a:endParaRPr dirty="0"/>
+          </a:p>
+          <a:p>
+            <a:r>
+              <a:rPr dirty="0"/>
+              <a:t>அ) </a:t>
+            </a:r>
+            <a:r>
+              <a:rPr dirty="0" err="1"/>
+              <a:t>விலங்குகள்</a:t>
+            </a:r>
+            <a:endParaRPr dirty="0"/>
+          </a:p>
+          <a:p>
+            <a:endParaRPr dirty="0"/>
+          </a:p>
+          <a:p>
+            <a:r>
+              <a:rPr dirty="0"/>
+              <a:t>ஆ) </a:t>
+            </a:r>
+            <a:r>
+              <a:rPr dirty="0" err="1"/>
+              <a:t>மொனிரா</a:t>
+            </a:r>
+            <a:endParaRPr dirty="0"/>
+          </a:p>
+          <a:p>
+            <a:endParaRPr dirty="0"/>
+          </a:p>
+          <a:p>
+            <a:r>
+              <a:rPr dirty="0"/>
+              <a:t>இ) </a:t>
+            </a:r>
+            <a:r>
+              <a:rPr dirty="0" err="1"/>
+              <a:t>புரோட்டிஸ்டா</a:t>
+            </a:r>
+            <a:endParaRPr dirty="0"/>
+          </a:p>
+          <a:p>
+            <a:endParaRPr dirty="0"/>
+          </a:p>
+          <a:p>
+            <a:r>
+              <a:rPr dirty="0"/>
+              <a:t>ஈ) </a:t>
+            </a:r>
+            <a:r>
+              <a:rPr dirty="0" err="1"/>
+              <a:t>பூஞ்சைகள்</a:t>
+            </a:r>
+            <a:endParaRPr dirty="0"/>
           </a:p>
         </p:txBody>
       </p:sp>
@@ -13501,7 +13615,7 @@
         <p:spPr>
           <a:xfrm>
             <a:off x="457200" y="457200"/>
-            <a:ext cx="7315200" cy="3657600"/>
+            <a:ext cx="7315200" cy="2431435"/>
           </a:xfrm>
           <a:prstGeom prst="rect">
             <a:avLst/>
@@ -13514,7 +13628,7 @@
           </a:bodyPr>
           <a:lstStyle/>
           <a:p>
-            <a:endParaRPr/>
+            <a:endParaRPr dirty="0"/>
           </a:p>
           <a:p>
             <a:pPr>
@@ -13526,19 +13640,109 @@
               </a:defRPr>
             </a:pPr>
             <a:r>
-              <a:t>Q - 28  கிரைசோஃபைட்கள், யூக்ளினாய்டுகள், டைனோஃபிளாச ஜெல்லேட்டுகள் மற்றும் ஸ்லைம் மோல்டுகள் இவை அனைத்தும் உள்ளடங்கிய பெரும்பிரிவு </a:t>
-            </a:r>
-          </a:p>
-          <a:p>
-            <a:endParaRPr/>
-          </a:p>
-          <a:p>
-            <a:r>
+              <a:rPr dirty="0"/>
+              <a:t>Q - 28  </a:t>
+            </a:r>
+            <a:r>
+              <a:rPr dirty="0" err="1"/>
+              <a:t>கிரைசோஃபைட்கள்</a:t>
+            </a:r>
+            <a:r>
+              <a:rPr dirty="0"/>
+              <a:t>, </a:t>
+            </a:r>
+            <a:r>
+              <a:rPr dirty="0" err="1"/>
+              <a:t>யூக்ளினாய்டுகள்</a:t>
+            </a:r>
+            <a:r>
+              <a:rPr dirty="0"/>
+              <a:t>, </a:t>
+            </a:r>
+            <a:r>
+              <a:rPr dirty="0" err="1"/>
+              <a:t>டைனோஃபிளாச</a:t>
+            </a:r>
+            <a:r>
+              <a:rPr dirty="0"/>
+              <a:t> </a:t>
+            </a:r>
+            <a:r>
+              <a:rPr dirty="0" err="1"/>
+              <a:t>ஜெல்லேட்டுகள்</a:t>
+            </a:r>
+            <a:r>
+              <a:rPr dirty="0"/>
+              <a:t> </a:t>
+            </a:r>
+            <a:r>
+              <a:rPr dirty="0" err="1"/>
+              <a:t>மற்றும்</a:t>
+            </a:r>
+            <a:r>
+              <a:rPr dirty="0"/>
+              <a:t> </a:t>
+            </a:r>
+            <a:r>
+              <a:rPr dirty="0" err="1"/>
+              <a:t>ஸ்லைம்</a:t>
+            </a:r>
+            <a:r>
+              <a:rPr dirty="0"/>
+              <a:t> </a:t>
+            </a:r>
+            <a:r>
+              <a:rPr dirty="0" err="1"/>
+              <a:t>மோல்டுகள்</a:t>
+            </a:r>
+            <a:r>
+              <a:rPr dirty="0"/>
+              <a:t> </a:t>
+            </a:r>
+            <a:r>
+              <a:rPr dirty="0" err="1"/>
+              <a:t>இவை</a:t>
+            </a:r>
+            <a:r>
+              <a:rPr dirty="0"/>
+              <a:t> </a:t>
+            </a:r>
+            <a:r>
+              <a:rPr dirty="0" err="1"/>
+              <a:t>அனைத்தும்</a:t>
+            </a:r>
+            <a:r>
+              <a:rPr dirty="0"/>
+              <a:t> </a:t>
+            </a:r>
+            <a:r>
+              <a:rPr dirty="0" err="1"/>
+              <a:t>உள்ளடங்கிய</a:t>
+            </a:r>
+            <a:r>
+              <a:rPr dirty="0"/>
+              <a:t> </a:t>
+            </a:r>
+            <a:r>
+              <a:rPr dirty="0" err="1"/>
+              <a:t>பெரும்பிரிவு</a:t>
+            </a:r>
+            <a:r>
+              <a:rPr dirty="0"/>
+              <a:t> </a:t>
+            </a:r>
+          </a:p>
+          <a:p>
+            <a:endParaRPr dirty="0"/>
+          </a:p>
+          <a:p>
+            <a:r>
+              <a:rPr dirty="0"/>
               <a:t>NEET - 2016</a:t>
             </a:r>
           </a:p>
           <a:p>
-            <a:endParaRPr/>
+            <a:endParaRPr dirty="0"/>
           </a:p>
           <a:p>
             <a:pPr>
@@ -13550,8 +13754,10 @@
               </a:defRPr>
             </a:pPr>
             <a:r>
-              <a:t>ஆ) மொனிரா</a:t>
-            </a:r>
+              <a:rPr lang="ta-IN" sz="1600" dirty="0"/>
+              <a:t>இ) புரோட்டிஸ்டா</a:t>
+            </a:r>
+            <a:endParaRPr sz="1600" dirty="0"/>
           </a:p>
         </p:txBody>
       </p:sp>

</xml_diff>